<commit_message>
+ drawer    + designer.py -> Full functionality.    + TEST_DRAWER.py -> Added designer.py Test cases.
</commit_message>
<xml_diff>
--- a/pptxs/test.pptx
+++ b/pptxs/test.pptx
@@ -243,7 +243,7 @@
           <a:p>
             <a:fld id="{B1503F4B-D54E-4220-97D2-7B7D1C097DE0}" type="datetimeFigureOut">
               <a:rPr lang="en-US" smtClean="0"/>
-              <a:t>2020-05-18</a:t>
+              <a:t>2020-05-28</a:t>
             </a:fld>
             <a:endParaRPr lang="en-US"/>
           </a:p>
@@ -413,7 +413,7 @@
           <a:p>
             <a:fld id="{B1503F4B-D54E-4220-97D2-7B7D1C097DE0}" type="datetimeFigureOut">
               <a:rPr lang="en-US" smtClean="0"/>
-              <a:t>2020-05-18</a:t>
+              <a:t>2020-05-28</a:t>
             </a:fld>
             <a:endParaRPr lang="en-US"/>
           </a:p>
@@ -593,7 +593,7 @@
           <a:p>
             <a:fld id="{B1503F4B-D54E-4220-97D2-7B7D1C097DE0}" type="datetimeFigureOut">
               <a:rPr lang="en-US" smtClean="0"/>
-              <a:t>2020-05-18</a:t>
+              <a:t>2020-05-28</a:t>
             </a:fld>
             <a:endParaRPr lang="en-US"/>
           </a:p>
@@ -763,7 +763,7 @@
           <a:p>
             <a:fld id="{B1503F4B-D54E-4220-97D2-7B7D1C097DE0}" type="datetimeFigureOut">
               <a:rPr lang="en-US" smtClean="0"/>
-              <a:t>2020-05-18</a:t>
+              <a:t>2020-05-28</a:t>
             </a:fld>
             <a:endParaRPr lang="en-US"/>
           </a:p>
@@ -1007,7 +1007,7 @@
           <a:p>
             <a:fld id="{B1503F4B-D54E-4220-97D2-7B7D1C097DE0}" type="datetimeFigureOut">
               <a:rPr lang="en-US" smtClean="0"/>
-              <a:t>2020-05-18</a:t>
+              <a:t>2020-05-28</a:t>
             </a:fld>
             <a:endParaRPr lang="en-US"/>
           </a:p>
@@ -1239,7 +1239,7 @@
           <a:p>
             <a:fld id="{B1503F4B-D54E-4220-97D2-7B7D1C097DE0}" type="datetimeFigureOut">
               <a:rPr lang="en-US" smtClean="0"/>
-              <a:t>2020-05-18</a:t>
+              <a:t>2020-05-28</a:t>
             </a:fld>
             <a:endParaRPr lang="en-US"/>
           </a:p>
@@ -1606,7 +1606,7 @@
           <a:p>
             <a:fld id="{B1503F4B-D54E-4220-97D2-7B7D1C097DE0}" type="datetimeFigureOut">
               <a:rPr lang="en-US" smtClean="0"/>
-              <a:t>2020-05-18</a:t>
+              <a:t>2020-05-28</a:t>
             </a:fld>
             <a:endParaRPr lang="en-US"/>
           </a:p>
@@ -1724,7 +1724,7 @@
           <a:p>
             <a:fld id="{B1503F4B-D54E-4220-97D2-7B7D1C097DE0}" type="datetimeFigureOut">
               <a:rPr lang="en-US" smtClean="0"/>
-              <a:t>2020-05-18</a:t>
+              <a:t>2020-05-28</a:t>
             </a:fld>
             <a:endParaRPr lang="en-US"/>
           </a:p>
@@ -1819,7 +1819,7 @@
           <a:p>
             <a:fld id="{B1503F4B-D54E-4220-97D2-7B7D1C097DE0}" type="datetimeFigureOut">
               <a:rPr lang="en-US" smtClean="0"/>
-              <a:t>2020-05-18</a:t>
+              <a:t>2020-05-28</a:t>
             </a:fld>
             <a:endParaRPr lang="en-US"/>
           </a:p>
@@ -2096,7 +2096,7 @@
           <a:p>
             <a:fld id="{B1503F4B-D54E-4220-97D2-7B7D1C097DE0}" type="datetimeFigureOut">
               <a:rPr lang="en-US" smtClean="0"/>
-              <a:t>2020-05-18</a:t>
+              <a:t>2020-05-28</a:t>
             </a:fld>
             <a:endParaRPr lang="en-US"/>
           </a:p>
@@ -2353,7 +2353,7 @@
           <a:p>
             <a:fld id="{B1503F4B-D54E-4220-97D2-7B7D1C097DE0}" type="datetimeFigureOut">
               <a:rPr lang="en-US" smtClean="0"/>
-              <a:t>2020-05-18</a:t>
+              <a:t>2020-05-28</a:t>
             </a:fld>
             <a:endParaRPr lang="en-US"/>
           </a:p>
@@ -2575,7 +2575,7 @@
           <a:p>
             <a:fld id="{B1503F4B-D54E-4220-97D2-7B7D1C097DE0}" type="datetimeFigureOut">
               <a:rPr lang="en-US" smtClean="0"/>
-              <a:t>2020-05-18</a:t>
+              <a:t>2020-05-28</a:t>
             </a:fld>
             <a:endParaRPr lang="en-US"/>
           </a:p>
@@ -2982,10 +2982,10 @@
       </p:grpSpPr>
       <p:sp>
         <p:nvSpPr>
-          <p:cNvPr id="5" name="TextBox 4">
+          <p:cNvPr id="2" name="TextBox 1">
             <a:extLst>
               <a:ext uri="{FF2B5EF4-FFF2-40B4-BE49-F238E27FC236}">
-                <a16:creationId xmlns:a16="http://schemas.microsoft.com/office/drawing/2014/main" id="{6494D117-5E90-4D98-91A8-4191329D0C14}"/>
+                <a16:creationId xmlns:a16="http://schemas.microsoft.com/office/drawing/2014/main" id="{2DF507B6-0841-4C0C-A1D7-303CAEE1E9BB}"/>
               </a:ext>
             </a:extLst>
           </p:cNvPr>
@@ -2994,36 +2994,84 @@
         </p:nvSpPr>
         <p:spPr>
           <a:xfrm>
-            <a:off x="994410" y="3951671"/>
-            <a:ext cx="8069580" cy="2155058"/>
+            <a:off x="2547257" y="470263"/>
+            <a:ext cx="5094514" cy="369332"/>
           </a:xfrm>
           <a:prstGeom prst="rect">
             <a:avLst/>
           </a:prstGeom>
-          <a:solidFill>
-            <a:srgbClr val="FAFAFA"/>
-          </a:solidFill>
-          <a:effectLst>
-            <a:outerShdw blurRad="50800" dist="38100" dir="5400000" algn="t" rotWithShape="0">
-              <a:prstClr val="black">
-                <a:alpha val="40000"/>
-              </a:prstClr>
-            </a:outerShdw>
-          </a:effectLst>
         </p:spPr>
-        <p:txBody>
-          <a:bodyPr wrap="square" lIns="457200" tIns="457200" rIns="457200" bIns="457200" rtlCol="0" anchor="ctr" anchorCtr="1">
-            <a:normAutofit fontScale="92500" lnSpcReduction="20000"/>
+        <p:style>
+          <a:lnRef idx="1">
+            <a:schemeClr val="accent4"/>
+          </a:lnRef>
+          <a:fillRef idx="2">
+            <a:schemeClr val="accent4"/>
+          </a:fillRef>
+          <a:effectRef idx="1">
+            <a:schemeClr val="accent4"/>
+          </a:effectRef>
+          <a:fontRef idx="minor">
+            <a:schemeClr val="dk1"/>
+          </a:fontRef>
+        </p:style>
+        <p:txBody>
+          <a:bodyPr wrap="square" rtlCol="0">
+            <a:spAutoFit/>
           </a:bodyPr>
           <a:lstStyle/>
           <a:p>
-            <a:pPr algn="ctr"/>
-            <a:r>
-              <a:rPr lang="en-US" sz="9600" dirty="0">
-                <a:latin typeface="IRANSans" panose="02040503050201020203" pitchFamily="18" charset="-78"/>
-                <a:cs typeface="IRANSans" panose="02040503050201020203" pitchFamily="18" charset="-78"/>
-              </a:rPr>
-              <a:t>{FUNCTION}</a:t>
+            <a:r>
+              <a:rPr lang="en-US" dirty="0"/>
+              <a:t>category</a:t>
+            </a:r>
+          </a:p>
+        </p:txBody>
+      </p:sp>
+      <p:sp>
+        <p:nvSpPr>
+          <p:cNvPr id="4" name="TextBox 3">
+            <a:extLst>
+              <a:ext uri="{FF2B5EF4-FFF2-40B4-BE49-F238E27FC236}">
+                <a16:creationId xmlns:a16="http://schemas.microsoft.com/office/drawing/2014/main" id="{FE11C269-A539-4798-91F2-FB2F4883B511}"/>
+              </a:ext>
+            </a:extLst>
+          </p:cNvPr>
+          <p:cNvSpPr txBox="1"/>
+          <p:nvPr/>
+        </p:nvSpPr>
+        <p:spPr>
+          <a:xfrm>
+            <a:off x="2481943" y="3026229"/>
+            <a:ext cx="5094514" cy="369332"/>
+          </a:xfrm>
+          <a:prstGeom prst="rect">
+            <a:avLst/>
+          </a:prstGeom>
+        </p:spPr>
+        <p:style>
+          <a:lnRef idx="1">
+            <a:schemeClr val="accent4"/>
+          </a:lnRef>
+          <a:fillRef idx="2">
+            <a:schemeClr val="accent4"/>
+          </a:fillRef>
+          <a:effectRef idx="1">
+            <a:schemeClr val="accent4"/>
+          </a:effectRef>
+          <a:fontRef idx="minor">
+            <a:schemeClr val="dk1"/>
+          </a:fontRef>
+        </p:style>
+        <p:txBody>
+          <a:bodyPr wrap="square" rtlCol="0">
+            <a:spAutoFit/>
+          </a:bodyPr>
+          <a:lstStyle/>
+          <a:p>
+            <a:r>
+              <a:rPr lang="en-US" dirty="0"/>
+              <a:t>function</a:t>
             </a:r>
           </a:p>
         </p:txBody>

</xml_diff>